<commit_message>
added diagrams for two classes
</commit_message>
<xml_diff>
--- a/docs/Computer Vision Driving Aids Design Review.pptx
+++ b/docs/Computer Vision Driving Aids Design Review.pptx
@@ -121,7 +121,7 @@
   </p:defaultTextStyle>
   <p:extLst>
     <p:ext uri="{EFAFB233-063F-42B5-8137-9DF3F51BA10A}">
-      <p15:sldGuideLst xmlns:p15="http://schemas.microsoft.com/office/powerpoint/2012/main" xmlns="">
+      <p15:sldGuideLst xmlns:p15="http://schemas.microsoft.com/office/powerpoint/2012/main">
         <p15:guide id="1" orient="horz" pos="2160">
           <p15:clr>
             <a:srgbClr val="A4A3A4"/>
@@ -13503,7 +13503,7 @@
           <p:cNvPr id="2" name="Title 1">
             <a:extLst>
               <a:ext uri="{FF2B5EF4-FFF2-40B4-BE49-F238E27FC236}">
-                <a16:creationId xmlns:a16="http://schemas.microsoft.com/office/drawing/2014/main" xmlns="" id="{78629773-1F2F-4DEA-A804-323B3E4F7636}"/>
+                <a16:creationId xmlns:a16="http://schemas.microsoft.com/office/drawing/2014/main" id="{78629773-1F2F-4DEA-A804-323B3E4F7636}"/>
               </a:ext>
             </a:extLst>
           </p:cNvPr>
@@ -13539,7 +13539,7 @@
           <p:cNvPr id="3" name="Subtitle 2">
             <a:extLst>
               <a:ext uri="{FF2B5EF4-FFF2-40B4-BE49-F238E27FC236}">
-                <a16:creationId xmlns:a16="http://schemas.microsoft.com/office/drawing/2014/main" xmlns="" id="{236AD9E0-AFB8-49D5-852F-5BFFF4F9DA95}"/>
+                <a16:creationId xmlns:a16="http://schemas.microsoft.com/office/drawing/2014/main" id="{236AD9E0-AFB8-49D5-852F-5BFFF4F9DA95}"/>
               </a:ext>
             </a:extLst>
           </p:cNvPr>
@@ -13621,7 +13621,7 @@
           <p:cNvPr id="2" name="Title 1">
             <a:extLst>
               <a:ext uri="{FF2B5EF4-FFF2-40B4-BE49-F238E27FC236}">
-                <a16:creationId xmlns:a16="http://schemas.microsoft.com/office/drawing/2014/main" xmlns="" id="{83A98772-6916-45F7-A022-D48EE0D87CF4}"/>
+                <a16:creationId xmlns:a16="http://schemas.microsoft.com/office/drawing/2014/main" id="{83A98772-6916-45F7-A022-D48EE0D87CF4}"/>
               </a:ext>
             </a:extLst>
           </p:cNvPr>
@@ -13653,7 +13653,7 @@
           <p:cNvPr id="2050" name="Picture 2" descr="https://github.com/Scarabyte/SSW690-Project/raw/master/docs/MainActivity.png">
             <a:extLst>
               <a:ext uri="{FF2B5EF4-FFF2-40B4-BE49-F238E27FC236}">
-                <a16:creationId xmlns:a16="http://schemas.microsoft.com/office/drawing/2014/main" xmlns="" id="{C3A3AE3A-6610-47E4-B287-C0B0AADBBE36}"/>
+                <a16:creationId xmlns:a16="http://schemas.microsoft.com/office/drawing/2014/main" id="{C3A3AE3A-6610-47E4-B287-C0B0AADBBE36}"/>
               </a:ext>
             </a:extLst>
           </p:cNvPr>
@@ -13732,7 +13732,7 @@
           <p:cNvPr id="2" name="Title 1">
             <a:extLst>
               <a:ext uri="{FF2B5EF4-FFF2-40B4-BE49-F238E27FC236}">
-                <a16:creationId xmlns:a16="http://schemas.microsoft.com/office/drawing/2014/main" xmlns="" id="{83A98772-6916-45F7-A022-D48EE0D87CF4}"/>
+                <a16:creationId xmlns:a16="http://schemas.microsoft.com/office/drawing/2014/main" id="{83A98772-6916-45F7-A022-D48EE0D87CF4}"/>
               </a:ext>
             </a:extLst>
           </p:cNvPr>
@@ -13759,31 +13759,35 @@
           </a:p>
         </p:txBody>
       </p:sp>
-      <p:sp>
-        <p:nvSpPr>
-          <p:cNvPr id="4" name="Content Placeholder 3">
+      <p:pic>
+        <p:nvPicPr>
+          <p:cNvPr id="5" name="Content Placeholder 4">
             <a:extLst>
               <a:ext uri="{FF2B5EF4-FFF2-40B4-BE49-F238E27FC236}">
-                <a16:creationId xmlns:a16="http://schemas.microsoft.com/office/drawing/2014/main" xmlns="" id="{C71EBFAB-BD14-49BD-A20D-DA932FC63CF0}"/>
+                <a16:creationId xmlns:a16="http://schemas.microsoft.com/office/drawing/2014/main" id="{7983F10D-E98E-421A-9A47-150361AF5C07}"/>
               </a:ext>
             </a:extLst>
           </p:cNvPr>
-          <p:cNvSpPr>
-            <a:spLocks noGrp="1"/>
-          </p:cNvSpPr>
+          <p:cNvPicPr>
+            <a:picLocks noGrp="1" noChangeAspect="1"/>
+          </p:cNvPicPr>
           <p:nvPr>
             <p:ph idx="1"/>
           </p:nvPr>
-        </p:nvSpPr>
-        <p:spPr/>
-        <p:txBody>
-          <a:bodyPr/>
-          <a:lstStyle/>
-          <a:p>
-            <a:endParaRPr lang="en-US"/>
-          </a:p>
-        </p:txBody>
-      </p:sp>
+        </p:nvPicPr>
+        <p:blipFill>
+          <a:blip r:embed="rId2"/>
+          <a:stretch>
+            <a:fillRect/>
+          </a:stretch>
+        </p:blipFill>
+        <p:spPr>
+          <a:xfrm>
+            <a:off x="2851150" y="3110706"/>
+            <a:ext cx="6486525" cy="1819275"/>
+          </a:xfrm>
+        </p:spPr>
+      </p:pic>
     </p:spTree>
     <p:extLst>
       <p:ext uri="{BB962C8B-B14F-4D97-AF65-F5344CB8AC3E}">
@@ -13819,7 +13823,7 @@
           <p:cNvPr id="2" name="Title 1">
             <a:extLst>
               <a:ext uri="{FF2B5EF4-FFF2-40B4-BE49-F238E27FC236}">
-                <a16:creationId xmlns:a16="http://schemas.microsoft.com/office/drawing/2014/main" xmlns="" id="{83A98772-6916-45F7-A022-D48EE0D87CF4}"/>
+                <a16:creationId xmlns:a16="http://schemas.microsoft.com/office/drawing/2014/main" id="{83A98772-6916-45F7-A022-D48EE0D87CF4}"/>
               </a:ext>
             </a:extLst>
           </p:cNvPr>
@@ -13846,31 +13850,35 @@
           </a:p>
         </p:txBody>
       </p:sp>
-      <p:sp>
-        <p:nvSpPr>
-          <p:cNvPr id="4" name="Content Placeholder 3">
+      <p:pic>
+        <p:nvPicPr>
+          <p:cNvPr id="5" name="Content Placeholder 4">
             <a:extLst>
               <a:ext uri="{FF2B5EF4-FFF2-40B4-BE49-F238E27FC236}">
-                <a16:creationId xmlns:a16="http://schemas.microsoft.com/office/drawing/2014/main" xmlns="" id="{C71EBFAB-BD14-49BD-A20D-DA932FC63CF0}"/>
+                <a16:creationId xmlns:a16="http://schemas.microsoft.com/office/drawing/2014/main" id="{70E06390-DCF6-4E1A-B28B-5E382C90D689}"/>
               </a:ext>
             </a:extLst>
           </p:cNvPr>
-          <p:cNvSpPr>
-            <a:spLocks noGrp="1"/>
-          </p:cNvSpPr>
+          <p:cNvPicPr>
+            <a:picLocks noGrp="1" noChangeAspect="1"/>
+          </p:cNvPicPr>
           <p:nvPr>
             <p:ph idx="1"/>
           </p:nvPr>
-        </p:nvSpPr>
-        <p:spPr/>
-        <p:txBody>
-          <a:bodyPr/>
-          <a:lstStyle/>
-          <a:p>
-            <a:endParaRPr lang="en-US"/>
-          </a:p>
-        </p:txBody>
-      </p:sp>
+        </p:nvPicPr>
+        <p:blipFill>
+          <a:blip r:embed="rId2"/>
+          <a:stretch>
+            <a:fillRect/>
+          </a:stretch>
+        </p:blipFill>
+        <p:spPr>
+          <a:xfrm>
+            <a:off x="4327525" y="3039269"/>
+            <a:ext cx="3533775" cy="1962150"/>
+          </a:xfrm>
+        </p:spPr>
+      </p:pic>
     </p:spTree>
     <p:extLst>
       <p:ext uri="{BB962C8B-B14F-4D97-AF65-F5344CB8AC3E}">
@@ -13906,7 +13914,7 @@
           <p:cNvPr id="2" name="Title 1">
             <a:extLst>
               <a:ext uri="{FF2B5EF4-FFF2-40B4-BE49-F238E27FC236}">
-                <a16:creationId xmlns:a16="http://schemas.microsoft.com/office/drawing/2014/main" xmlns="" id="{83A98772-6916-45F7-A022-D48EE0D87CF4}"/>
+                <a16:creationId xmlns:a16="http://schemas.microsoft.com/office/drawing/2014/main" id="{83A98772-6916-45F7-A022-D48EE0D87CF4}"/>
               </a:ext>
             </a:extLst>
           </p:cNvPr>
@@ -13938,7 +13946,7 @@
           <p:cNvPr id="4" name="Content Placeholder 3">
             <a:extLst>
               <a:ext uri="{FF2B5EF4-FFF2-40B4-BE49-F238E27FC236}">
-                <a16:creationId xmlns:a16="http://schemas.microsoft.com/office/drawing/2014/main" xmlns="" id="{C71EBFAB-BD14-49BD-A20D-DA932FC63CF0}"/>
+                <a16:creationId xmlns:a16="http://schemas.microsoft.com/office/drawing/2014/main" id="{C71EBFAB-BD14-49BD-A20D-DA932FC63CF0}"/>
               </a:ext>
             </a:extLst>
           </p:cNvPr>
@@ -13954,7 +13962,27 @@
           <a:bodyPr/>
           <a:lstStyle/>
           <a:p>
-            <a:endParaRPr lang="en-US"/>
+            <a:pPr lvl="4"/>
+            <a:endParaRPr lang="en-US" dirty="0"/>
+          </a:p>
+          <a:p>
+            <a:pPr lvl="4"/>
+            <a:endParaRPr lang="en-US" dirty="0"/>
+          </a:p>
+          <a:p>
+            <a:pPr lvl="4"/>
+            <a:endParaRPr lang="en-US" dirty="0"/>
+          </a:p>
+          <a:p>
+            <a:pPr lvl="4"/>
+            <a:endParaRPr lang="en-US" dirty="0"/>
+          </a:p>
+          <a:p>
+            <a:pPr lvl="8"/>
+            <a:r>
+              <a:rPr lang="en-US" sz="2000" dirty="0"/>
+              <a:t>TBD</a:t>
+            </a:r>
           </a:p>
         </p:txBody>
       </p:sp>
@@ -13993,7 +14021,7 @@
           <p:cNvPr id="2" name="Title 1">
             <a:extLst>
               <a:ext uri="{FF2B5EF4-FFF2-40B4-BE49-F238E27FC236}">
-                <a16:creationId xmlns:a16="http://schemas.microsoft.com/office/drawing/2014/main" xmlns="" id="{5F163758-F730-4FFD-9F9E-F0FC8CDDB240}"/>
+                <a16:creationId xmlns:a16="http://schemas.microsoft.com/office/drawing/2014/main" id="{5F163758-F730-4FFD-9F9E-F0FC8CDDB240}"/>
               </a:ext>
             </a:extLst>
           </p:cNvPr>
@@ -14021,7 +14049,7 @@
           <p:cNvPr id="3" name="Content Placeholder 2">
             <a:extLst>
               <a:ext uri="{FF2B5EF4-FFF2-40B4-BE49-F238E27FC236}">
-                <a16:creationId xmlns:a16="http://schemas.microsoft.com/office/drawing/2014/main" xmlns="" id="{C5EBD364-4FCA-4AC5-A62F-1E06EC8240DE}"/>
+                <a16:creationId xmlns:a16="http://schemas.microsoft.com/office/drawing/2014/main" id="{C5EBD364-4FCA-4AC5-A62F-1E06EC8240DE}"/>
               </a:ext>
             </a:extLst>
           </p:cNvPr>
@@ -14043,10 +14071,6 @@
               <a:rPr lang="en-US" u="sng" dirty="0"/>
               <a:t>Belorkar, Sapana</a:t>
             </a:r>
-            <a:r>
-              <a:rPr lang="en-US" dirty="0"/>
-              <a:t/>
-            </a:r>
             <a:br>
               <a:rPr lang="en-US" dirty="0"/>
             </a:br>
@@ -14077,10 +14101,6 @@
               <a:rPr lang="en-US" u="sng" dirty="0"/>
               <a:t>Roseberry, Keith</a:t>
             </a:r>
-            <a:r>
-              <a:rPr lang="en-US" dirty="0"/>
-              <a:t/>
-            </a:r>
             <a:br>
               <a:rPr lang="en-US" dirty="0"/>
             </a:br>
@@ -14093,10 +14113,6 @@
             <a:r>
               <a:rPr lang="en-US" u="sng" dirty="0"/>
               <a:t>Varadaraju, Rakshith</a:t>
-            </a:r>
-            <a:r>
-              <a:rPr lang="en-US" dirty="0"/>
-              <a:t/>
             </a:r>
             <a:br>
               <a:rPr lang="en-US" dirty="0"/>
@@ -14143,7 +14159,7 @@
           <p:cNvPr id="2" name="Title 1">
             <a:extLst>
               <a:ext uri="{FF2B5EF4-FFF2-40B4-BE49-F238E27FC236}">
-                <a16:creationId xmlns:a16="http://schemas.microsoft.com/office/drawing/2014/main" xmlns="" id="{948A0E38-AB97-4175-B372-9627013E206C}"/>
+                <a16:creationId xmlns:a16="http://schemas.microsoft.com/office/drawing/2014/main" id="{948A0E38-AB97-4175-B372-9627013E206C}"/>
               </a:ext>
             </a:extLst>
           </p:cNvPr>
@@ -14171,7 +14187,7 @@
           <p:cNvPr id="3" name="Content Placeholder 2">
             <a:extLst>
               <a:ext uri="{FF2B5EF4-FFF2-40B4-BE49-F238E27FC236}">
-                <a16:creationId xmlns:a16="http://schemas.microsoft.com/office/drawing/2014/main" xmlns="" id="{1CAB4BB1-33CD-4BB7-BA3A-A13ECB37D4A2}"/>
+                <a16:creationId xmlns:a16="http://schemas.microsoft.com/office/drawing/2014/main" id="{1CAB4BB1-33CD-4BB7-BA3A-A13ECB37D4A2}"/>
               </a:ext>
             </a:extLst>
           </p:cNvPr>
@@ -14270,7 +14286,7 @@
           <p:cNvPr id="2" name="Title 1">
             <a:extLst>
               <a:ext uri="{FF2B5EF4-FFF2-40B4-BE49-F238E27FC236}">
-                <a16:creationId xmlns:a16="http://schemas.microsoft.com/office/drawing/2014/main" xmlns="" id="{B0E04909-FB5A-4AD9-BC1D-52CB8571C410}"/>
+                <a16:creationId xmlns:a16="http://schemas.microsoft.com/office/drawing/2014/main" id="{B0E04909-FB5A-4AD9-BC1D-52CB8571C410}"/>
               </a:ext>
             </a:extLst>
           </p:cNvPr>
@@ -14298,7 +14314,7 @@
           <p:cNvPr id="7" name="Content Placeholder 6">
             <a:extLst>
               <a:ext uri="{FF2B5EF4-FFF2-40B4-BE49-F238E27FC236}">
-                <a16:creationId xmlns:a16="http://schemas.microsoft.com/office/drawing/2014/main" xmlns="" id="{B6CF72C3-5213-4C14-94B1-08C1BB3C68B2}"/>
+                <a16:creationId xmlns:a16="http://schemas.microsoft.com/office/drawing/2014/main" id="{B6CF72C3-5213-4C14-94B1-08C1BB3C68B2}"/>
               </a:ext>
             </a:extLst>
           </p:cNvPr>
@@ -14357,7 +14373,7 @@
           <p:cNvPr id="2" name="Title 1">
             <a:extLst>
               <a:ext uri="{FF2B5EF4-FFF2-40B4-BE49-F238E27FC236}">
-                <a16:creationId xmlns:a16="http://schemas.microsoft.com/office/drawing/2014/main" xmlns="" id="{B0E04909-FB5A-4AD9-BC1D-52CB8571C410}"/>
+                <a16:creationId xmlns:a16="http://schemas.microsoft.com/office/drawing/2014/main" id="{B0E04909-FB5A-4AD9-BC1D-52CB8571C410}"/>
               </a:ext>
             </a:extLst>
           </p:cNvPr>
@@ -14385,7 +14401,7 @@
           <p:cNvPr id="1026" name="Picture 2" descr="https://github.com/Scarabyte/SSW690-Project/raw/master/docs/Back%20Seat%20Driver%20App%20Architecture.png">
             <a:extLst>
               <a:ext uri="{FF2B5EF4-FFF2-40B4-BE49-F238E27FC236}">
-                <a16:creationId xmlns:a16="http://schemas.microsoft.com/office/drawing/2014/main" xmlns="" id="{943D4075-5EBF-46D8-BD7A-313F1CB79B39}"/>
+                <a16:creationId xmlns:a16="http://schemas.microsoft.com/office/drawing/2014/main" id="{943D4075-5EBF-46D8-BD7A-313F1CB79B39}"/>
               </a:ext>
             </a:extLst>
           </p:cNvPr>
@@ -14464,7 +14480,7 @@
           <p:cNvPr id="2" name="Title 1">
             <a:extLst>
               <a:ext uri="{FF2B5EF4-FFF2-40B4-BE49-F238E27FC236}">
-                <a16:creationId xmlns:a16="http://schemas.microsoft.com/office/drawing/2014/main" xmlns="" id="{DECEED8C-8056-413E-A592-BB0187CDB79E}"/>
+                <a16:creationId xmlns:a16="http://schemas.microsoft.com/office/drawing/2014/main" id="{DECEED8C-8056-413E-A592-BB0187CDB79E}"/>
               </a:ext>
             </a:extLst>
           </p:cNvPr>
@@ -14492,7 +14508,7 @@
           <p:cNvPr id="3" name="Content Placeholder 2">
             <a:extLst>
               <a:ext uri="{FF2B5EF4-FFF2-40B4-BE49-F238E27FC236}">
-                <a16:creationId xmlns:a16="http://schemas.microsoft.com/office/drawing/2014/main" xmlns="" id="{1307FA08-610A-483E-89FC-84C6BD4C9B49}"/>
+                <a16:creationId xmlns:a16="http://schemas.microsoft.com/office/drawing/2014/main" id="{1307FA08-610A-483E-89FC-84C6BD4C9B49}"/>
               </a:ext>
             </a:extLst>
           </p:cNvPr>
@@ -14653,7 +14669,7 @@
           <p:cNvPr id="2" name="Title 1">
             <a:extLst>
               <a:ext uri="{FF2B5EF4-FFF2-40B4-BE49-F238E27FC236}">
-                <a16:creationId xmlns:a16="http://schemas.microsoft.com/office/drawing/2014/main" xmlns="" id="{B0E04909-FB5A-4AD9-BC1D-52CB8571C410}"/>
+                <a16:creationId xmlns:a16="http://schemas.microsoft.com/office/drawing/2014/main" id="{B0E04909-FB5A-4AD9-BC1D-52CB8571C410}"/>
               </a:ext>
             </a:extLst>
           </p:cNvPr>
@@ -14757,7 +14773,7 @@
           <p:cNvPr id="2" name="Title 1">
             <a:extLst>
               <a:ext uri="{FF2B5EF4-FFF2-40B4-BE49-F238E27FC236}">
-                <a16:creationId xmlns:a16="http://schemas.microsoft.com/office/drawing/2014/main" xmlns="" id="{B0E04909-FB5A-4AD9-BC1D-52CB8571C410}"/>
+                <a16:creationId xmlns:a16="http://schemas.microsoft.com/office/drawing/2014/main" id="{B0E04909-FB5A-4AD9-BC1D-52CB8571C410}"/>
               </a:ext>
             </a:extLst>
           </p:cNvPr>
@@ -14785,7 +14801,7 @@
           <p:cNvPr id="5" name="Content Placeholder 4">
             <a:extLst>
               <a:ext uri="{FF2B5EF4-FFF2-40B4-BE49-F238E27FC236}">
-                <a16:creationId xmlns:a16="http://schemas.microsoft.com/office/drawing/2014/main" xmlns="" id="{E42C3B2D-82BC-4639-8395-89D81B44EE6E}"/>
+                <a16:creationId xmlns:a16="http://schemas.microsoft.com/office/drawing/2014/main" id="{E42C3B2D-82BC-4639-8395-89D81B44EE6E}"/>
               </a:ext>
             </a:extLst>
           </p:cNvPr>
@@ -14862,7 +14878,7 @@
           <p:cNvPr id="2" name="Title 1">
             <a:extLst>
               <a:ext uri="{FF2B5EF4-FFF2-40B4-BE49-F238E27FC236}">
-                <a16:creationId xmlns:a16="http://schemas.microsoft.com/office/drawing/2014/main" xmlns="" id="{B0E04909-FB5A-4AD9-BC1D-52CB8571C410}"/>
+                <a16:creationId xmlns:a16="http://schemas.microsoft.com/office/drawing/2014/main" id="{B0E04909-FB5A-4AD9-BC1D-52CB8571C410}"/>
               </a:ext>
             </a:extLst>
           </p:cNvPr>
@@ -14895,7 +14911,7 @@
           <p:cNvPr id="4" name="Content Placeholder 3">
             <a:extLst>
               <a:ext uri="{FF2B5EF4-FFF2-40B4-BE49-F238E27FC236}">
-                <a16:creationId xmlns:a16="http://schemas.microsoft.com/office/drawing/2014/main" xmlns="" id="{356C8CA0-7FC4-4DDA-8B85-BC21CA2507C1}"/>
+                <a16:creationId xmlns:a16="http://schemas.microsoft.com/office/drawing/2014/main" id="{356C8CA0-7FC4-4DDA-8B85-BC21CA2507C1}"/>
               </a:ext>
             </a:extLst>
           </p:cNvPr>
@@ -14923,13 +14939,8 @@
             </a:pPr>
             <a:r>
               <a:rPr lang="en-US" dirty="0"/>
-              <a:t>Scenario 1 : Normal </a:t>
-            </a:r>
-            <a:r>
-              <a:rPr lang="en-US" dirty="0" smtClean="0"/>
-              <a:t>Operation</a:t>
-            </a:r>
-            <a:endParaRPr lang="en-US" dirty="0"/>
+              <a:t>Scenario 1 : Normal Operation</a:t>
+            </a:r>
           </a:p>
           <a:p>
             <a:r>
@@ -14985,13 +14996,8 @@
           <a:p>
             <a:r>
               <a:rPr lang="en-US" dirty="0"/>
-              <a:t>Application continues to monitor for next lane </a:t>
-            </a:r>
-            <a:r>
-              <a:rPr lang="en-US" dirty="0" smtClean="0"/>
-              <a:t>departure</a:t>
-            </a:r>
-            <a:endParaRPr lang="en-US" dirty="0"/>
+              <a:t>Application continues to monitor for next lane departure</a:t>
+            </a:r>
           </a:p>
         </p:txBody>
       </p:sp>
@@ -15253,7 +15259,7 @@
   <a:extraClrSchemeLst/>
   <a:extLst>
     <a:ext uri="{05A4C25C-085E-4340-85A3-A5531E510DB2}">
-      <thm15:themeFamily xmlns:thm15="http://schemas.microsoft.com/office/thememl/2012/main" xmlns="" name="Circuit" id="{0AC2F7E7-15F5-431C-B2A2-456FE929F56C}" vid="{0911B802-464C-4241-8DD9-B60FF88E379F}"/>
+      <thm15:themeFamily xmlns:thm15="http://schemas.microsoft.com/office/thememl/2012/main" name="Circuit" id="{0AC2F7E7-15F5-431C-B2A2-456FE929F56C}" vid="{0911B802-464C-4241-8DD9-B60FF88E379F}"/>
     </a:ext>
   </a:extLst>
 </a:theme>
@@ -15548,7 +15554,7 @@
   <a:extraClrSchemeLst/>
   <a:extLst>
     <a:ext uri="{05A4C25C-085E-4340-85A3-A5531E510DB2}">
-      <thm15:themeFamily xmlns:thm15="http://schemas.microsoft.com/office/thememl/2012/main" xmlns="" name="Office Theme" id="{62F939B6-93AF-4DB8-9C6B-D6C7DFDC589F}" vid="{4A3C46E8-61CC-4603-A589-7422A47A8E4A}"/>
+      <thm15:themeFamily xmlns:thm15="http://schemas.microsoft.com/office/thememl/2012/main" name="Office Theme" id="{62F939B6-93AF-4DB8-9C6B-D6C7DFDC589F}" vid="{4A3C46E8-61CC-4603-A589-7422A47A8E4A}"/>
     </a:ext>
   </a:extLst>
 </a:theme>

</xml_diff>

<commit_message>
Update slide with User Scenario
</commit_message>
<xml_diff>
--- a/docs/Computer Vision Driving Aids Design Review.pptx
+++ b/docs/Computer Vision Driving Aids Design Review.pptx
@@ -16,7 +16,7 @@
     <p:sldId id="270" r:id="rId7"/>
     <p:sldId id="264" r:id="rId8"/>
     <p:sldId id="265" r:id="rId9"/>
-    <p:sldId id="266" r:id="rId10"/>
+    <p:sldId id="271" r:id="rId10"/>
     <p:sldId id="262" r:id="rId11"/>
     <p:sldId id="267" r:id="rId12"/>
     <p:sldId id="268" r:id="rId13"/>
@@ -192,21 +192,6 @@
 </file>
 
 <file path=ppt/comments/comment4.xml><?xml version="1.0" encoding="utf-8"?>
-<p:cmLst xmlns:a="http://schemas.openxmlformats.org/drawingml/2006/main" xmlns:r="http://schemas.openxmlformats.org/officeDocument/2006/relationships" xmlns:p="http://schemas.openxmlformats.org/presentationml/2006/main">
-  <p:cm authorId="1" dt="2018-09-02T19:09:57.300" idx="3">
-    <p:pos x="10" y="10"/>
-    <p:text>1) Add an audio output
-2) Arrows are directional (input from camera, output to display/audio).</p:text>
-    <p:extLst>
-      <p:ext uri="{C676402C-5697-4E1C-873F-D02D1690AC5C}">
-        <p15:threadingInfo xmlns:p15="http://schemas.microsoft.com/office/powerpoint/2012/main" timeZoneBias="240"/>
-      </p:ext>
-    </p:extLst>
-  </p:cm>
-</p:cmLst>
-</file>
-
-<file path=ppt/comments/comment5.xml><?xml version="1.0" encoding="utf-8"?>
 <p:cmLst xmlns:a="http://schemas.openxmlformats.org/drawingml/2006/main" xmlns:r="http://schemas.openxmlformats.org/officeDocument/2006/relationships" xmlns:p="http://schemas.openxmlformats.org/presentationml/2006/main">
   <p:cm authorId="1" dt="2018-09-02T19:09:57.300" idx="3">
     <p:pos x="10" y="10"/>
@@ -14889,12 +14874,7 @@
             <p:ph type="title"/>
           </p:nvPr>
         </p:nvSpPr>
-        <p:spPr>
-          <a:xfrm>
-            <a:off x="1141413" y="355471"/>
-            <a:ext cx="9905998" cy="771871"/>
-          </a:xfrm>
-        </p:spPr>
+        <p:spPr/>
         <p:txBody>
           <a:bodyPr/>
           <a:lstStyle/>
@@ -14922,89 +14902,123 @@
             <p:ph idx="1"/>
           </p:nvPr>
         </p:nvSpPr>
+        <p:spPr/>
+        <p:txBody>
+          <a:bodyPr>
+            <a:normAutofit fontScale="70000" lnSpcReduction="20000"/>
+          </a:bodyPr>
+          <a:lstStyle/>
+          <a:p>
+            <a:r>
+              <a:rPr lang="en-US" dirty="0"/>
+              <a:t>Normal Operation</a:t>
+            </a:r>
+          </a:p>
+          <a:p>
+            <a:pPr lvl="1"/>
+            <a:r>
+              <a:rPr lang="en-US" dirty="0"/>
+              <a:t>Launch Application</a:t>
+            </a:r>
+          </a:p>
+          <a:p>
+            <a:pPr lvl="1"/>
+            <a:r>
+              <a:rPr lang="en-US" dirty="0"/>
+              <a:t>Application monitors for lane departure</a:t>
+            </a:r>
+          </a:p>
+          <a:p>
+            <a:pPr lvl="1"/>
+            <a:r>
+              <a:rPr lang="en-US" dirty="0"/>
+              <a:t>Application alerts user when car is close to leaving the lane</a:t>
+            </a:r>
+          </a:p>
+          <a:p>
+            <a:pPr lvl="1"/>
+            <a:r>
+              <a:rPr lang="en-US" dirty="0"/>
+              <a:t>User closes application at end of trip</a:t>
+            </a:r>
+          </a:p>
+          <a:p>
+            <a:r>
+              <a:rPr lang="en-US" dirty="0"/>
+              <a:t>Lane Departure Alert</a:t>
+            </a:r>
+          </a:p>
+          <a:p>
+            <a:pPr lvl="1"/>
+            <a:r>
+              <a:rPr lang="en-US" dirty="0"/>
+              <a:t>Launch Application</a:t>
+            </a:r>
+          </a:p>
+          <a:p>
+            <a:pPr lvl="1"/>
+            <a:r>
+              <a:rPr lang="en-US" dirty="0"/>
+              <a:t>Application monitors for lane departure</a:t>
+            </a:r>
+          </a:p>
+          <a:p>
+            <a:pPr lvl="1"/>
+            <a:r>
+              <a:rPr lang="en-US" dirty="0"/>
+              <a:t>Application detects lane departure</a:t>
+            </a:r>
+          </a:p>
+          <a:p>
+            <a:pPr lvl="1"/>
+            <a:r>
+              <a:rPr lang="en-US" dirty="0"/>
+              <a:t>Application triggers audio alert</a:t>
+            </a:r>
+          </a:p>
+          <a:p>
+            <a:pPr lvl="1"/>
+            <a:r>
+              <a:rPr lang="en-US" dirty="0"/>
+              <a:t>Application continues to monitor next lane departure</a:t>
+            </a:r>
+          </a:p>
+        </p:txBody>
+      </p:sp>
+      <p:pic>
+        <p:nvPicPr>
+          <p:cNvPr id="3" name="Picture 2">
+            <a:extLst>
+              <a:ext uri="{FF2B5EF4-FFF2-40B4-BE49-F238E27FC236}">
+                <a16:creationId xmlns:a16="http://schemas.microsoft.com/office/drawing/2014/main" id="{7CE367AC-E73D-4AB5-9E52-A03194708013}"/>
+              </a:ext>
+            </a:extLst>
+          </p:cNvPr>
+          <p:cNvPicPr>
+            <a:picLocks noChangeAspect="1"/>
+          </p:cNvPicPr>
+          <p:nvPr/>
+        </p:nvPicPr>
+        <p:blipFill>
+          <a:blip r:embed="rId3"/>
+          <a:stretch>
+            <a:fillRect/>
+          </a:stretch>
+        </p:blipFill>
         <p:spPr>
           <a:xfrm>
-            <a:off x="1141412" y="1615858"/>
-            <a:ext cx="9905999" cy="4496843"/>
+            <a:off x="6696635" y="1717823"/>
+            <a:ext cx="5314950" cy="4114800"/>
           </a:xfrm>
+          <a:prstGeom prst="rect">
+            <a:avLst/>
+          </a:prstGeom>
         </p:spPr>
-        <p:txBody>
-          <a:bodyPr>
-            <a:normAutofit fontScale="85000" lnSpcReduction="20000"/>
-          </a:bodyPr>
-          <a:lstStyle/>
-          <a:p>
-            <a:pPr marL="0" indent="0">
-              <a:buNone/>
-            </a:pPr>
-            <a:r>
-              <a:rPr lang="en-US" dirty="0"/>
-              <a:t>Scenario 1 : Normal Operation</a:t>
-            </a:r>
-          </a:p>
-          <a:p>
-            <a:r>
-              <a:rPr lang="en-US" dirty="0"/>
-              <a:t>Launch the application from an android phone</a:t>
-            </a:r>
-          </a:p>
-          <a:p>
-            <a:r>
-              <a:rPr lang="en-US" dirty="0"/>
-              <a:t>Application processes inputs from camera looking for lane lines</a:t>
-            </a:r>
-          </a:p>
-          <a:p>
-            <a:r>
-              <a:rPr lang="en-US" dirty="0"/>
-              <a:t>Application alerts user when car is driven close to a lane</a:t>
-            </a:r>
-          </a:p>
-          <a:p>
-            <a:r>
-              <a:rPr lang="en-US" dirty="0"/>
-              <a:t>User closes application when destination is reached</a:t>
-            </a:r>
-          </a:p>
-          <a:p>
-            <a:pPr marL="0" indent="0">
-              <a:buNone/>
-            </a:pPr>
-            <a:r>
-              <a:rPr lang="en-US" dirty="0"/>
-              <a:t>Scenario 2 : Lane Departure Alert</a:t>
-            </a:r>
-          </a:p>
-          <a:p>
-            <a:r>
-              <a:rPr lang="en-US" dirty="0"/>
-              <a:t>Launch the application from an android phone</a:t>
-            </a:r>
-          </a:p>
-          <a:p>
-            <a:r>
-              <a:rPr lang="en-US" dirty="0"/>
-              <a:t>Application detects from camera that vehicle is leaving lane</a:t>
-            </a:r>
-          </a:p>
-          <a:p>
-            <a:r>
-              <a:rPr lang="en-US" dirty="0"/>
-              <a:t>Application alerts user with audio and visual cues that vehicle is leaving the lane</a:t>
-            </a:r>
-          </a:p>
-          <a:p>
-            <a:r>
-              <a:rPr lang="en-US" dirty="0"/>
-              <a:t>Application continues to monitor for next lane departure</a:t>
-            </a:r>
-          </a:p>
-        </p:txBody>
-      </p:sp>
+      </p:pic>
     </p:spTree>
     <p:extLst>
       <p:ext uri="{BB962C8B-B14F-4D97-AF65-F5344CB8AC3E}">
-        <p14:creationId xmlns:p14="http://schemas.microsoft.com/office/powerpoint/2010/main" val="3373434655"/>
+        <p14:creationId xmlns:p14="http://schemas.microsoft.com/office/powerpoint/2010/main" val="2539559315"/>
       </p:ext>
     </p:extLst>
   </p:cSld>

</xml_diff>